<commit_message>
Updating screenshots in README
</commit_message>
<xml_diff>
--- a/screenshot.pptx
+++ b/screenshot.pptx
@@ -104,6 +104,11 @@
       </a:defRPr>
     </a:lvl9pPr>
   </p:defaultTextStyle>
+  <p:extLst>
+    <p:ext uri="{EFAFB233-063F-42B5-8137-9DF3F51BA10A}">
+      <p15:sldGuideLst xmlns:p15="http://schemas.microsoft.com/office/powerpoint/2012/main"/>
+    </p:ext>
+  </p:extLst>
 </p:presentation>
 </file>
 
@@ -238,7 +243,7 @@
           <a:p>
             <a:fld id="{64C9F0F5-459F-4D48-A8D4-4ED1638AB4B4}" type="datetimeFigureOut">
               <a:rPr lang="en-US" smtClean="0"/>
-              <a:t>8/23/20</a:t>
+              <a:t>9/6/20</a:t>
             </a:fld>
             <a:endParaRPr lang="en-US"/>
           </a:p>
@@ -408,7 +413,7 @@
           <a:p>
             <a:fld id="{64C9F0F5-459F-4D48-A8D4-4ED1638AB4B4}" type="datetimeFigureOut">
               <a:rPr lang="en-US" smtClean="0"/>
-              <a:t>8/23/20</a:t>
+              <a:t>9/6/20</a:t>
             </a:fld>
             <a:endParaRPr lang="en-US"/>
           </a:p>
@@ -588,7 +593,7 @@
           <a:p>
             <a:fld id="{64C9F0F5-459F-4D48-A8D4-4ED1638AB4B4}" type="datetimeFigureOut">
               <a:rPr lang="en-US" smtClean="0"/>
-              <a:t>8/23/20</a:t>
+              <a:t>9/6/20</a:t>
             </a:fld>
             <a:endParaRPr lang="en-US"/>
           </a:p>
@@ -758,7 +763,7 @@
           <a:p>
             <a:fld id="{64C9F0F5-459F-4D48-A8D4-4ED1638AB4B4}" type="datetimeFigureOut">
               <a:rPr lang="en-US" smtClean="0"/>
-              <a:t>8/23/20</a:t>
+              <a:t>9/6/20</a:t>
             </a:fld>
             <a:endParaRPr lang="en-US"/>
           </a:p>
@@ -1002,7 +1007,7 @@
           <a:p>
             <a:fld id="{64C9F0F5-459F-4D48-A8D4-4ED1638AB4B4}" type="datetimeFigureOut">
               <a:rPr lang="en-US" smtClean="0"/>
-              <a:t>8/23/20</a:t>
+              <a:t>9/6/20</a:t>
             </a:fld>
             <a:endParaRPr lang="en-US"/>
           </a:p>
@@ -1234,7 +1239,7 @@
           <a:p>
             <a:fld id="{64C9F0F5-459F-4D48-A8D4-4ED1638AB4B4}" type="datetimeFigureOut">
               <a:rPr lang="en-US" smtClean="0"/>
-              <a:t>8/23/20</a:t>
+              <a:t>9/6/20</a:t>
             </a:fld>
             <a:endParaRPr lang="en-US"/>
           </a:p>
@@ -1601,7 +1606,7 @@
           <a:p>
             <a:fld id="{64C9F0F5-459F-4D48-A8D4-4ED1638AB4B4}" type="datetimeFigureOut">
               <a:rPr lang="en-US" smtClean="0"/>
-              <a:t>8/23/20</a:t>
+              <a:t>9/6/20</a:t>
             </a:fld>
             <a:endParaRPr lang="en-US"/>
           </a:p>
@@ -1719,7 +1724,7 @@
           <a:p>
             <a:fld id="{64C9F0F5-459F-4D48-A8D4-4ED1638AB4B4}" type="datetimeFigureOut">
               <a:rPr lang="en-US" smtClean="0"/>
-              <a:t>8/23/20</a:t>
+              <a:t>9/6/20</a:t>
             </a:fld>
             <a:endParaRPr lang="en-US"/>
           </a:p>
@@ -1814,7 +1819,7 @@
           <a:p>
             <a:fld id="{64C9F0F5-459F-4D48-A8D4-4ED1638AB4B4}" type="datetimeFigureOut">
               <a:rPr lang="en-US" smtClean="0"/>
-              <a:t>8/23/20</a:t>
+              <a:t>9/6/20</a:t>
             </a:fld>
             <a:endParaRPr lang="en-US"/>
           </a:p>
@@ -2091,7 +2096,7 @@
           <a:p>
             <a:fld id="{64C9F0F5-459F-4D48-A8D4-4ED1638AB4B4}" type="datetimeFigureOut">
               <a:rPr lang="en-US" smtClean="0"/>
-              <a:t>8/23/20</a:t>
+              <a:t>9/6/20</a:t>
             </a:fld>
             <a:endParaRPr lang="en-US"/>
           </a:p>
@@ -2348,7 +2353,7 @@
           <a:p>
             <a:fld id="{64C9F0F5-459F-4D48-A8D4-4ED1638AB4B4}" type="datetimeFigureOut">
               <a:rPr lang="en-US" smtClean="0"/>
-              <a:t>8/23/20</a:t>
+              <a:t>9/6/20</a:t>
             </a:fld>
             <a:endParaRPr lang="en-US"/>
           </a:p>
@@ -2561,7 +2566,7 @@
           <a:p>
             <a:fld id="{64C9F0F5-459F-4D48-A8D4-4ED1638AB4B4}" type="datetimeFigureOut">
               <a:rPr lang="en-US" smtClean="0"/>
-              <a:t>8/23/20</a:t>
+              <a:t>9/6/20</a:t>
             </a:fld>
             <a:endParaRPr lang="en-US"/>
           </a:p>
@@ -3042,7 +3047,7 @@
       </p:pic>
       <p:pic>
         <p:nvPicPr>
-          <p:cNvPr id="11" name="Picture 10" descr="A screenshot of a cell phone&#10;&#10;Description automatically generated">
+          <p:cNvPr id="11" name="Picture 10">
             <a:extLst>
               <a:ext uri="{FF2B5EF4-FFF2-40B4-BE49-F238E27FC236}">
                 <a16:creationId xmlns:a16="http://schemas.microsoft.com/office/drawing/2014/main" id="{BB2F02EF-F505-E54C-BC36-DFC36ED69DE8}"/>
@@ -3054,16 +3059,15 @@
           </p:cNvPicPr>
           <p:nvPr/>
         </p:nvPicPr>
-        <p:blipFill>
+        <p:blipFill rotWithShape="1">
           <a:blip r:embed="rId4"/>
-          <a:stretch>
-            <a:fillRect/>
-          </a:stretch>
+          <a:srcRect r="2806"/>
+          <a:stretch/>
         </p:blipFill>
         <p:spPr>
           <a:xfrm>
-            <a:off x="6716068" y="8103492"/>
-            <a:ext cx="10007854" cy="7956296"/>
+            <a:off x="7596051" y="8103492"/>
+            <a:ext cx="8016482" cy="7956296"/>
           </a:xfrm>
           <a:prstGeom prst="rect">
             <a:avLst/>

</xml_diff>